<commit_message>
LOG_ANALYSIS: presentation + update
</commit_message>
<xml_diff>
--- a/gupb/controller/ares/extra/log_analysis.pptx
+++ b/gupb/controller/ares/extra/log_analysis.pptx
@@ -13,6 +13,7 @@
     <p:sldId id="263" r:id="rId7"/>
     <p:sldId id="260" r:id="rId8"/>
     <p:sldId id="261" r:id="rId9"/>
+    <p:sldId id="265" r:id="rId10"/>
   </p:sldIdLst>
   <p:sldSz cx="12192000" cy="6858000"/>
   <p:notesSz cx="6858000" cy="9144000"/>
@@ -111,6 +112,11 @@
       </a:defRPr>
     </a:lvl9pPr>
   </p:defaultTextStyle>
+  <p:extLst>
+    <p:ext uri="{EFAFB233-063F-42B5-8137-9DF3F51BA10A}">
+      <p15:sldGuideLst xmlns:p15="http://schemas.microsoft.com/office/powerpoint/2012/main"/>
+    </p:ext>
+  </p:extLst>
 </p:presentation>
 </file>
 
@@ -3828,6 +3834,66 @@
 </p:sld>
 </file>
 
+<file path=ppt/slides/slide9.xml><?xml version="1.0" encoding="utf-8"?>
+<p:sld xmlns:a="http://schemas.openxmlformats.org/drawingml/2006/main" xmlns:r="http://schemas.openxmlformats.org/officeDocument/2006/relationships" xmlns:p="http://schemas.openxmlformats.org/presentationml/2006/main">
+  <p:cSld>
+    <p:spTree>
+      <p:nvGrpSpPr>
+        <p:cNvPr id="1" name=""/>
+        <p:cNvGrpSpPr/>
+        <p:nvPr/>
+      </p:nvGrpSpPr>
+      <p:grpSpPr>
+        <a:xfrm>
+          <a:off x="0" y="0"/>
+          <a:ext cx="0" cy="0"/>
+          <a:chOff x="0" y="0"/>
+          <a:chExt cx="0" cy="0"/>
+        </a:xfrm>
+      </p:grpSpPr>
+      <p:pic>
+        <p:nvPicPr>
+          <p:cNvPr id="3" name="Obraz 2">
+            <a:extLst>
+              <a:ext uri="{FF2B5EF4-FFF2-40B4-BE49-F238E27FC236}">
+                <a16:creationId xmlns:a16="http://schemas.microsoft.com/office/drawing/2014/main" id="{6176AE94-4F9A-1BB8-5929-6BB8246F5F09}"/>
+              </a:ext>
+            </a:extLst>
+          </p:cNvPr>
+          <p:cNvPicPr>
+            <a:picLocks noChangeAspect="1"/>
+          </p:cNvPicPr>
+          <p:nvPr/>
+        </p:nvPicPr>
+        <p:blipFill>
+          <a:blip r:embed="rId2"/>
+          <a:stretch>
+            <a:fillRect/>
+          </a:stretch>
+        </p:blipFill>
+        <p:spPr>
+          <a:xfrm>
+            <a:off x="1188095" y="203017"/>
+            <a:ext cx="9815809" cy="6451965"/>
+          </a:xfrm>
+          <a:prstGeom prst="rect">
+            <a:avLst/>
+          </a:prstGeom>
+        </p:spPr>
+      </p:pic>
+    </p:spTree>
+    <p:extLst>
+      <p:ext uri="{BB962C8B-B14F-4D97-AF65-F5344CB8AC3E}">
+        <p14:creationId xmlns:p14="http://schemas.microsoft.com/office/powerpoint/2010/main" val="788962599"/>
+      </p:ext>
+    </p:extLst>
+  </p:cSld>
+  <p:clrMapOvr>
+    <a:masterClrMapping/>
+  </p:clrMapOvr>
+</p:sld>
+</file>
+
 <file path=ppt/theme/theme1.xml><?xml version="1.0" encoding="utf-8"?>
 <a:theme xmlns:a="http://schemas.openxmlformats.org/drawingml/2006/main" name="Motyw pakietu Office">
   <a:themeElements>

</xml_diff>